<commit_message>
Mudança do Sprint 002
Adição do diagrama de classes no sprint
</commit_message>
<xml_diff>
--- a/Sprints/Sprint_002 da equipe.pptx
+++ b/Sprints/Sprint_002 da equipe.pptx
@@ -8,10 +8,11 @@
     <p:sldId id="256" r:id="rId2"/>
     <p:sldId id="260" r:id="rId3"/>
     <p:sldId id="279" r:id="rId4"/>
-    <p:sldId id="281" r:id="rId5"/>
-    <p:sldId id="270" r:id="rId6"/>
-    <p:sldId id="261" r:id="rId7"/>
-    <p:sldId id="280" r:id="rId8"/>
+    <p:sldId id="282" r:id="rId5"/>
+    <p:sldId id="281" r:id="rId6"/>
+    <p:sldId id="270" r:id="rId7"/>
+    <p:sldId id="261" r:id="rId8"/>
+    <p:sldId id="280" r:id="rId9"/>
   </p:sldIdLst>
   <p:sldSz cx="12192000" cy="6858000"/>
   <p:notesSz cx="6858000" cy="9144000"/>
@@ -354,7 +355,7 @@
             <a:fld id="{5586B75A-687E-405C-8A0B-8D00578BA2C3}" type="datetimeFigureOut">
               <a:rPr lang="en-US" dirty="0"/>
               <a:pPr/>
-              <a:t>9/16/2018</a:t>
+              <a:t>9/17/2018</a:t>
             </a:fld>
             <a:endParaRPr lang="en-US" dirty="0"/>
           </a:p>
@@ -521,7 +522,7 @@
             <a:fld id="{5586B75A-687E-405C-8A0B-8D00578BA2C3}" type="datetimeFigureOut">
               <a:rPr lang="en-US" dirty="0"/>
               <a:pPr/>
-              <a:t>9/16/2018</a:t>
+              <a:t>9/17/2018</a:t>
             </a:fld>
             <a:endParaRPr lang="en-US" dirty="0"/>
           </a:p>
@@ -698,7 +699,7 @@
             <a:fld id="{5586B75A-687E-405C-8A0B-8D00578BA2C3}" type="datetimeFigureOut">
               <a:rPr lang="en-US" dirty="0"/>
               <a:pPr/>
-              <a:t>9/16/2018</a:t>
+              <a:t>9/17/2018</a:t>
             </a:fld>
             <a:endParaRPr lang="en-US" dirty="0"/>
           </a:p>
@@ -865,7 +866,7 @@
             <a:fld id="{5586B75A-687E-405C-8A0B-8D00578BA2C3}" type="datetimeFigureOut">
               <a:rPr lang="en-US" dirty="0"/>
               <a:pPr/>
-              <a:t>9/16/2018</a:t>
+              <a:t>9/17/2018</a:t>
             </a:fld>
             <a:endParaRPr lang="en-US" dirty="0"/>
           </a:p>
@@ -1120,7 +1121,7 @@
             <a:fld id="{5586B75A-687E-405C-8A0B-8D00578BA2C3}" type="datetimeFigureOut">
               <a:rPr lang="en-US" dirty="0"/>
               <a:pPr/>
-              <a:t>9/16/2018</a:t>
+              <a:t>9/17/2018</a:t>
             </a:fld>
             <a:endParaRPr lang="en-US" dirty="0"/>
           </a:p>
@@ -1405,7 +1406,7 @@
             <a:fld id="{5586B75A-687E-405C-8A0B-8D00578BA2C3}" type="datetimeFigureOut">
               <a:rPr lang="en-US" dirty="0"/>
               <a:pPr/>
-              <a:t>9/16/2018</a:t>
+              <a:t>9/17/2018</a:t>
             </a:fld>
             <a:endParaRPr lang="en-US" dirty="0"/>
           </a:p>
@@ -1844,7 +1845,7 @@
             <a:fld id="{5586B75A-687E-405C-8A0B-8D00578BA2C3}" type="datetimeFigureOut">
               <a:rPr lang="en-US" dirty="0"/>
               <a:pPr/>
-              <a:t>9/16/2018</a:t>
+              <a:t>9/17/2018</a:t>
             </a:fld>
             <a:endParaRPr lang="en-US" dirty="0"/>
           </a:p>
@@ -1959,7 +1960,7 @@
             <a:fld id="{5586B75A-687E-405C-8A0B-8D00578BA2C3}" type="datetimeFigureOut">
               <a:rPr lang="en-US" dirty="0"/>
               <a:pPr/>
-              <a:t>9/16/2018</a:t>
+              <a:t>9/17/2018</a:t>
             </a:fld>
             <a:endParaRPr lang="en-US" dirty="0"/>
           </a:p>
@@ -2051,7 +2052,7 @@
             <a:fld id="{5586B75A-687E-405C-8A0B-8D00578BA2C3}" type="datetimeFigureOut">
               <a:rPr lang="en-US" dirty="0"/>
               <a:pPr/>
-              <a:t>9/16/2018</a:t>
+              <a:t>9/17/2018</a:t>
             </a:fld>
             <a:endParaRPr lang="en-US" dirty="0"/>
           </a:p>
@@ -2336,7 +2337,7 @@
             <a:fld id="{5586B75A-687E-405C-8A0B-8D00578BA2C3}" type="datetimeFigureOut">
               <a:rPr lang="en-US" dirty="0"/>
               <a:pPr/>
-              <a:t>9/16/2018</a:t>
+              <a:t>9/17/2018</a:t>
             </a:fld>
             <a:endParaRPr lang="en-US" dirty="0"/>
           </a:p>
@@ -2606,7 +2607,7 @@
             <a:fld id="{5586B75A-687E-405C-8A0B-8D00578BA2C3}" type="datetimeFigureOut">
               <a:rPr lang="en-US" dirty="0"/>
               <a:pPr/>
-              <a:t>9/16/2018</a:t>
+              <a:t>9/17/2018</a:t>
             </a:fld>
             <a:endParaRPr lang="en-US" dirty="0"/>
           </a:p>
@@ -2900,7 +2901,7 @@
             <a:fld id="{5586B75A-687E-405C-8A0B-8D00578BA2C3}" type="datetimeFigureOut">
               <a:rPr lang="en-US" dirty="0"/>
               <a:pPr/>
-              <a:t>9/16/2018</a:t>
+              <a:t>9/17/2018</a:t>
             </a:fld>
             <a:endParaRPr lang="en-US" dirty="0"/>
           </a:p>
@@ -3769,104 +3770,46 @@
           <a:chExt cx="0" cy="0"/>
         </a:xfrm>
       </p:grpSpPr>
-      <p:sp>
-        <p:nvSpPr>
-          <p:cNvPr id="2" name="Título 1"/>
-          <p:cNvSpPr>
-            <a:spLocks noGrp="1"/>
-          </p:cNvSpPr>
-          <p:nvPr>
-            <p:ph type="title"/>
-          </p:nvPr>
-        </p:nvSpPr>
-        <p:spPr/>
-        <p:txBody>
-          <a:bodyPr/>
-          <a:lstStyle/>
-          <a:p>
-            <a:r>
-              <a:rPr lang="pt-BR" dirty="0"/>
-              <a:t>2ª Estória</a:t>
-            </a:r>
-          </a:p>
-        </p:txBody>
-      </p:sp>
-      <p:sp>
-        <p:nvSpPr>
-          <p:cNvPr id="3" name="Espaço Reservado para Conteúdo 2"/>
-          <p:cNvSpPr>
-            <a:spLocks noGrp="1"/>
-          </p:cNvSpPr>
-          <p:nvPr>
-            <p:ph idx="1"/>
-          </p:nvPr>
-        </p:nvSpPr>
+      <p:pic>
+        <p:nvPicPr>
+          <p:cNvPr id="3" name="Imagem 2">
+            <a:extLst>
+              <a:ext uri="{FF2B5EF4-FFF2-40B4-BE49-F238E27FC236}">
+                <a16:creationId xmlns:a16="http://schemas.microsoft.com/office/drawing/2014/main" id="{E8A72F72-EBC7-41B2-91C5-8FB305D9E82E}"/>
+              </a:ext>
+            </a:extLst>
+          </p:cNvPr>
+          <p:cNvPicPr>
+            <a:picLocks noChangeAspect="1"/>
+          </p:cNvPicPr>
+          <p:nvPr/>
+        </p:nvPicPr>
+        <p:blipFill>
+          <a:blip r:embed="rId2"/>
+          <a:stretch>
+            <a:fillRect/>
+          </a:stretch>
+        </p:blipFill>
         <p:spPr>
           <a:xfrm>
-            <a:off x="3869268" y="864108"/>
-            <a:ext cx="7490710" cy="5120640"/>
+            <a:off x="30851" y="372547"/>
+            <a:ext cx="12130299" cy="6112907"/>
           </a:xfrm>
+          <a:prstGeom prst="rect">
+            <a:avLst/>
+          </a:prstGeom>
         </p:spPr>
-        <p:txBody>
-          <a:bodyPr/>
-          <a:lstStyle/>
-          <a:p>
-            <a:pPr algn="just"/>
-            <a:r>
-              <a:rPr lang="pt-BR" b="1" dirty="0"/>
-              <a:t>2ª Estória: </a:t>
-            </a:r>
-            <a:r>
-              <a:rPr lang="pt-BR" dirty="0"/>
-              <a:t>Elaboração da descrição detalhada do sistema, explicando seus requisitos funcionais e não funcionais.</a:t>
-            </a:r>
-          </a:p>
-          <a:p>
-            <a:pPr algn="just"/>
-            <a:r>
-              <a:rPr lang="pt-BR" b="1" dirty="0"/>
-              <a:t>Descrição</a:t>
-            </a:r>
-            <a:r>
-              <a:rPr lang="pt-BR" dirty="0"/>
-              <a:t>: A descrição do sistema será entregue conforme a data prevista com todos os dados dos requisitos do sistema e com o diagrama de classes.</a:t>
-            </a:r>
-          </a:p>
-          <a:p>
-            <a:pPr algn="just"/>
-            <a:r>
-              <a:rPr lang="pt-BR" b="1" dirty="0"/>
-              <a:t>Status: [Concluído]</a:t>
-            </a:r>
-            <a:r>
-              <a:rPr lang="pt-BR" dirty="0"/>
-              <a:t>.</a:t>
-            </a:r>
-          </a:p>
-        </p:txBody>
-      </p:sp>
+      </p:pic>
     </p:spTree>
     <p:extLst>
       <p:ext uri="{BB962C8B-B14F-4D97-AF65-F5344CB8AC3E}">
-        <p14:creationId xmlns:p14="http://schemas.microsoft.com/office/powerpoint/2010/main" val="1396510283"/>
+        <p14:creationId xmlns:p14="http://schemas.microsoft.com/office/powerpoint/2010/main" val="681861647"/>
       </p:ext>
     </p:extLst>
   </p:cSld>
   <p:clrMapOvr>
     <a:masterClrMapping/>
   </p:clrMapOvr>
-  <mc:AlternateContent xmlns:mc="http://schemas.openxmlformats.org/markup-compatibility/2006" xmlns:p14="http://schemas.microsoft.com/office/powerpoint/2010/main">
-    <mc:Choice Requires="p14">
-      <p:transition spd="slow" p14:dur="1300">
-        <p14:pan dir="u"/>
-      </p:transition>
-    </mc:Choice>
-    <mc:Fallback xmlns="">
-      <p:transition spd="slow">
-        <p:fade/>
-      </p:transition>
-    </mc:Fallback>
-  </mc:AlternateContent>
 </p:sld>
 </file>
 
@@ -3904,7 +3847,7 @@
           <a:p>
             <a:r>
               <a:rPr lang="pt-BR" dirty="0"/>
-              <a:t>3ª Estória</a:t>
+              <a:t>2ª Estória</a:t>
             </a:r>
           </a:p>
         </p:txBody>
@@ -3932,11 +3875,11 @@
             <a:pPr algn="just"/>
             <a:r>
               <a:rPr lang="pt-BR" b="1" dirty="0"/>
-              <a:t>3ª Estória: </a:t>
+              <a:t>2ª Estória: </a:t>
             </a:r>
             <a:r>
               <a:rPr lang="pt-BR" dirty="0"/>
-              <a:t>Pesquisar a implementação do Banco de Dados e da Interface Gráfica.</a:t>
+              <a:t>Elaboração da descrição detalhada do sistema, explicando seus requisitos funcionais e não funcionais.</a:t>
             </a:r>
           </a:p>
           <a:p>
@@ -3947,14 +3890,14 @@
             </a:r>
             <a:r>
               <a:rPr lang="pt-BR" dirty="0"/>
-              <a:t>:   Entender como implementar um Banco de Dados e como juntar a interface aos scripts.</a:t>
+              <a:t>: A descrição do sistema será entregue conforme a data prevista com todos os dados dos requisitos do sistema e com o diagrama de classes.</a:t>
             </a:r>
           </a:p>
           <a:p>
             <a:pPr algn="just"/>
             <a:r>
               <a:rPr lang="pt-BR" b="1" dirty="0"/>
-              <a:t>Status: [Em andamento]</a:t>
+              <a:t>Status: [Concluído]</a:t>
             </a:r>
             <a:r>
               <a:rPr lang="pt-BR" dirty="0"/>
@@ -3966,7 +3909,7 @@
     </p:spTree>
     <p:extLst>
       <p:ext uri="{BB962C8B-B14F-4D97-AF65-F5344CB8AC3E}">
-        <p14:creationId xmlns:p14="http://schemas.microsoft.com/office/powerpoint/2010/main" val="774972579"/>
+        <p14:creationId xmlns:p14="http://schemas.microsoft.com/office/powerpoint/2010/main" val="1396510283"/>
       </p:ext>
     </p:extLst>
   </p:cSld>
@@ -4007,6 +3950,124 @@
       </p:grpSpPr>
       <p:sp>
         <p:nvSpPr>
+          <p:cNvPr id="2" name="Título 1"/>
+          <p:cNvSpPr>
+            <a:spLocks noGrp="1"/>
+          </p:cNvSpPr>
+          <p:nvPr>
+            <p:ph type="title"/>
+          </p:nvPr>
+        </p:nvSpPr>
+        <p:spPr/>
+        <p:txBody>
+          <a:bodyPr/>
+          <a:lstStyle/>
+          <a:p>
+            <a:r>
+              <a:rPr lang="pt-BR" dirty="0"/>
+              <a:t>3ª Estória</a:t>
+            </a:r>
+          </a:p>
+        </p:txBody>
+      </p:sp>
+      <p:sp>
+        <p:nvSpPr>
+          <p:cNvPr id="3" name="Espaço Reservado para Conteúdo 2"/>
+          <p:cNvSpPr>
+            <a:spLocks noGrp="1"/>
+          </p:cNvSpPr>
+          <p:nvPr>
+            <p:ph idx="1"/>
+          </p:nvPr>
+        </p:nvSpPr>
+        <p:spPr>
+          <a:xfrm>
+            <a:off x="3869268" y="864108"/>
+            <a:ext cx="7490710" cy="5120640"/>
+          </a:xfrm>
+        </p:spPr>
+        <p:txBody>
+          <a:bodyPr/>
+          <a:lstStyle/>
+          <a:p>
+            <a:pPr algn="just"/>
+            <a:r>
+              <a:rPr lang="pt-BR" b="1" dirty="0"/>
+              <a:t>3ª Estória: </a:t>
+            </a:r>
+            <a:r>
+              <a:rPr lang="pt-BR" dirty="0"/>
+              <a:t>Pesquisar a implementação do Banco de Dados e da Interface Gráfica.</a:t>
+            </a:r>
+          </a:p>
+          <a:p>
+            <a:pPr algn="just"/>
+            <a:r>
+              <a:rPr lang="pt-BR" b="1" dirty="0"/>
+              <a:t>Descrição</a:t>
+            </a:r>
+            <a:r>
+              <a:rPr lang="pt-BR" dirty="0"/>
+              <a:t>:   Entender como implementar um Banco de Dados e como juntar a interface aos scripts.</a:t>
+            </a:r>
+          </a:p>
+          <a:p>
+            <a:pPr algn="just"/>
+            <a:r>
+              <a:rPr lang="pt-BR" b="1" dirty="0"/>
+              <a:t>Status: [Em andamento]</a:t>
+            </a:r>
+            <a:r>
+              <a:rPr lang="pt-BR" dirty="0"/>
+              <a:t>.</a:t>
+            </a:r>
+          </a:p>
+        </p:txBody>
+      </p:sp>
+    </p:spTree>
+    <p:extLst>
+      <p:ext uri="{BB962C8B-B14F-4D97-AF65-F5344CB8AC3E}">
+        <p14:creationId xmlns:p14="http://schemas.microsoft.com/office/powerpoint/2010/main" val="774972579"/>
+      </p:ext>
+    </p:extLst>
+  </p:cSld>
+  <p:clrMapOvr>
+    <a:masterClrMapping/>
+  </p:clrMapOvr>
+  <mc:AlternateContent xmlns:mc="http://schemas.openxmlformats.org/markup-compatibility/2006" xmlns:p14="http://schemas.microsoft.com/office/powerpoint/2010/main">
+    <mc:Choice Requires="p14">
+      <p:transition spd="slow" p14:dur="1300">
+        <p14:pan dir="u"/>
+      </p:transition>
+    </mc:Choice>
+    <mc:Fallback xmlns="">
+      <p:transition spd="slow">
+        <p:fade/>
+      </p:transition>
+    </mc:Fallback>
+  </mc:AlternateContent>
+</p:sld>
+</file>
+
+<file path=ppt/slides/slide7.xml><?xml version="1.0" encoding="utf-8"?>
+<p:sld xmlns:a="http://schemas.openxmlformats.org/drawingml/2006/main" xmlns:r="http://schemas.openxmlformats.org/officeDocument/2006/relationships" xmlns:p="http://schemas.openxmlformats.org/presentationml/2006/main">
+  <p:cSld>
+    <p:spTree>
+      <p:nvGrpSpPr>
+        <p:cNvPr id="1" name=""/>
+        <p:cNvGrpSpPr/>
+        <p:nvPr/>
+      </p:nvGrpSpPr>
+      <p:grpSpPr>
+        <a:xfrm>
+          <a:off x="0" y="0"/>
+          <a:ext cx="0" cy="0"/>
+          <a:chOff x="0" y="0"/>
+          <a:chExt cx="0" cy="0"/>
+        </a:xfrm>
+      </p:grpSpPr>
+      <p:sp>
+        <p:nvSpPr>
           <p:cNvPr id="12" name="Título 11"/>
           <p:cNvSpPr>
             <a:spLocks noGrp="1"/>
@@ -4071,7 +4132,7 @@
 </p:sld>
 </file>
 
-<file path=ppt/slides/slide7.xml><?xml version="1.0" encoding="utf-8"?>
+<file path=ppt/slides/slide8.xml><?xml version="1.0" encoding="utf-8"?>
 <p:sld xmlns:a="http://schemas.openxmlformats.org/drawingml/2006/main" xmlns:r="http://schemas.openxmlformats.org/officeDocument/2006/relationships" xmlns:p="http://schemas.openxmlformats.org/presentationml/2006/main">
   <p:cSld>
     <p:spTree>

</xml_diff>

<commit_message>
Revert "Mudança do Sprint 002"
This reverts commit 3b6e70227f9ca8e24ac174b1fc9b3ba794c0ec23.
</commit_message>
<xml_diff>
--- a/Sprints/Sprint_002 da equipe.pptx
+++ b/Sprints/Sprint_002 da equipe.pptx
@@ -8,11 +8,10 @@
     <p:sldId id="256" r:id="rId2"/>
     <p:sldId id="260" r:id="rId3"/>
     <p:sldId id="279" r:id="rId4"/>
-    <p:sldId id="282" r:id="rId5"/>
-    <p:sldId id="281" r:id="rId6"/>
-    <p:sldId id="270" r:id="rId7"/>
-    <p:sldId id="261" r:id="rId8"/>
-    <p:sldId id="280" r:id="rId9"/>
+    <p:sldId id="281" r:id="rId5"/>
+    <p:sldId id="270" r:id="rId6"/>
+    <p:sldId id="261" r:id="rId7"/>
+    <p:sldId id="280" r:id="rId8"/>
   </p:sldIdLst>
   <p:sldSz cx="12192000" cy="6858000"/>
   <p:notesSz cx="6858000" cy="9144000"/>
@@ -355,7 +354,7 @@
             <a:fld id="{5586B75A-687E-405C-8A0B-8D00578BA2C3}" type="datetimeFigureOut">
               <a:rPr lang="en-US" dirty="0"/>
               <a:pPr/>
-              <a:t>9/17/2018</a:t>
+              <a:t>9/16/2018</a:t>
             </a:fld>
             <a:endParaRPr lang="en-US" dirty="0"/>
           </a:p>
@@ -522,7 +521,7 @@
             <a:fld id="{5586B75A-687E-405C-8A0B-8D00578BA2C3}" type="datetimeFigureOut">
               <a:rPr lang="en-US" dirty="0"/>
               <a:pPr/>
-              <a:t>9/17/2018</a:t>
+              <a:t>9/16/2018</a:t>
             </a:fld>
             <a:endParaRPr lang="en-US" dirty="0"/>
           </a:p>
@@ -699,7 +698,7 @@
             <a:fld id="{5586B75A-687E-405C-8A0B-8D00578BA2C3}" type="datetimeFigureOut">
               <a:rPr lang="en-US" dirty="0"/>
               <a:pPr/>
-              <a:t>9/17/2018</a:t>
+              <a:t>9/16/2018</a:t>
             </a:fld>
             <a:endParaRPr lang="en-US" dirty="0"/>
           </a:p>
@@ -866,7 +865,7 @@
             <a:fld id="{5586B75A-687E-405C-8A0B-8D00578BA2C3}" type="datetimeFigureOut">
               <a:rPr lang="en-US" dirty="0"/>
               <a:pPr/>
-              <a:t>9/17/2018</a:t>
+              <a:t>9/16/2018</a:t>
             </a:fld>
             <a:endParaRPr lang="en-US" dirty="0"/>
           </a:p>
@@ -1121,7 +1120,7 @@
             <a:fld id="{5586B75A-687E-405C-8A0B-8D00578BA2C3}" type="datetimeFigureOut">
               <a:rPr lang="en-US" dirty="0"/>
               <a:pPr/>
-              <a:t>9/17/2018</a:t>
+              <a:t>9/16/2018</a:t>
             </a:fld>
             <a:endParaRPr lang="en-US" dirty="0"/>
           </a:p>
@@ -1406,7 +1405,7 @@
             <a:fld id="{5586B75A-687E-405C-8A0B-8D00578BA2C3}" type="datetimeFigureOut">
               <a:rPr lang="en-US" dirty="0"/>
               <a:pPr/>
-              <a:t>9/17/2018</a:t>
+              <a:t>9/16/2018</a:t>
             </a:fld>
             <a:endParaRPr lang="en-US" dirty="0"/>
           </a:p>
@@ -1845,7 +1844,7 @@
             <a:fld id="{5586B75A-687E-405C-8A0B-8D00578BA2C3}" type="datetimeFigureOut">
               <a:rPr lang="en-US" dirty="0"/>
               <a:pPr/>
-              <a:t>9/17/2018</a:t>
+              <a:t>9/16/2018</a:t>
             </a:fld>
             <a:endParaRPr lang="en-US" dirty="0"/>
           </a:p>
@@ -1960,7 +1959,7 @@
             <a:fld id="{5586B75A-687E-405C-8A0B-8D00578BA2C3}" type="datetimeFigureOut">
               <a:rPr lang="en-US" dirty="0"/>
               <a:pPr/>
-              <a:t>9/17/2018</a:t>
+              <a:t>9/16/2018</a:t>
             </a:fld>
             <a:endParaRPr lang="en-US" dirty="0"/>
           </a:p>
@@ -2052,7 +2051,7 @@
             <a:fld id="{5586B75A-687E-405C-8A0B-8D00578BA2C3}" type="datetimeFigureOut">
               <a:rPr lang="en-US" dirty="0"/>
               <a:pPr/>
-              <a:t>9/17/2018</a:t>
+              <a:t>9/16/2018</a:t>
             </a:fld>
             <a:endParaRPr lang="en-US" dirty="0"/>
           </a:p>
@@ -2337,7 +2336,7 @@
             <a:fld id="{5586B75A-687E-405C-8A0B-8D00578BA2C3}" type="datetimeFigureOut">
               <a:rPr lang="en-US" dirty="0"/>
               <a:pPr/>
-              <a:t>9/17/2018</a:t>
+              <a:t>9/16/2018</a:t>
             </a:fld>
             <a:endParaRPr lang="en-US" dirty="0"/>
           </a:p>
@@ -2607,7 +2606,7 @@
             <a:fld id="{5586B75A-687E-405C-8A0B-8D00578BA2C3}" type="datetimeFigureOut">
               <a:rPr lang="en-US" dirty="0"/>
               <a:pPr/>
-              <a:t>9/17/2018</a:t>
+              <a:t>9/16/2018</a:t>
             </a:fld>
             <a:endParaRPr lang="en-US" dirty="0"/>
           </a:p>
@@ -2901,7 +2900,7 @@
             <a:fld id="{5586B75A-687E-405C-8A0B-8D00578BA2C3}" type="datetimeFigureOut">
               <a:rPr lang="en-US" dirty="0"/>
               <a:pPr/>
-              <a:t>9/17/2018</a:t>
+              <a:t>9/16/2018</a:t>
             </a:fld>
             <a:endParaRPr lang="en-US" dirty="0"/>
           </a:p>
@@ -3770,46 +3769,104 @@
           <a:chExt cx="0" cy="0"/>
         </a:xfrm>
       </p:grpSpPr>
-      <p:pic>
-        <p:nvPicPr>
-          <p:cNvPr id="3" name="Imagem 2">
-            <a:extLst>
-              <a:ext uri="{FF2B5EF4-FFF2-40B4-BE49-F238E27FC236}">
-                <a16:creationId xmlns:a16="http://schemas.microsoft.com/office/drawing/2014/main" id="{E8A72F72-EBC7-41B2-91C5-8FB305D9E82E}"/>
-              </a:ext>
-            </a:extLst>
-          </p:cNvPr>
-          <p:cNvPicPr>
-            <a:picLocks noChangeAspect="1"/>
-          </p:cNvPicPr>
-          <p:nvPr/>
-        </p:nvPicPr>
-        <p:blipFill>
-          <a:blip r:embed="rId2"/>
-          <a:stretch>
-            <a:fillRect/>
-          </a:stretch>
-        </p:blipFill>
+      <p:sp>
+        <p:nvSpPr>
+          <p:cNvPr id="2" name="Título 1"/>
+          <p:cNvSpPr>
+            <a:spLocks noGrp="1"/>
+          </p:cNvSpPr>
+          <p:nvPr>
+            <p:ph type="title"/>
+          </p:nvPr>
+        </p:nvSpPr>
+        <p:spPr/>
+        <p:txBody>
+          <a:bodyPr/>
+          <a:lstStyle/>
+          <a:p>
+            <a:r>
+              <a:rPr lang="pt-BR" dirty="0"/>
+              <a:t>2ª Estória</a:t>
+            </a:r>
+          </a:p>
+        </p:txBody>
+      </p:sp>
+      <p:sp>
+        <p:nvSpPr>
+          <p:cNvPr id="3" name="Espaço Reservado para Conteúdo 2"/>
+          <p:cNvSpPr>
+            <a:spLocks noGrp="1"/>
+          </p:cNvSpPr>
+          <p:nvPr>
+            <p:ph idx="1"/>
+          </p:nvPr>
+        </p:nvSpPr>
         <p:spPr>
           <a:xfrm>
-            <a:off x="30851" y="372547"/>
-            <a:ext cx="12130299" cy="6112907"/>
+            <a:off x="3869268" y="864108"/>
+            <a:ext cx="7490710" cy="5120640"/>
           </a:xfrm>
-          <a:prstGeom prst="rect">
-            <a:avLst/>
-          </a:prstGeom>
         </p:spPr>
-      </p:pic>
+        <p:txBody>
+          <a:bodyPr/>
+          <a:lstStyle/>
+          <a:p>
+            <a:pPr algn="just"/>
+            <a:r>
+              <a:rPr lang="pt-BR" b="1" dirty="0"/>
+              <a:t>2ª Estória: </a:t>
+            </a:r>
+            <a:r>
+              <a:rPr lang="pt-BR" dirty="0"/>
+              <a:t>Elaboração da descrição detalhada do sistema, explicando seus requisitos funcionais e não funcionais.</a:t>
+            </a:r>
+          </a:p>
+          <a:p>
+            <a:pPr algn="just"/>
+            <a:r>
+              <a:rPr lang="pt-BR" b="1" dirty="0"/>
+              <a:t>Descrição</a:t>
+            </a:r>
+            <a:r>
+              <a:rPr lang="pt-BR" dirty="0"/>
+              <a:t>: A descrição do sistema será entregue conforme a data prevista com todos os dados dos requisitos do sistema e com o diagrama de classes.</a:t>
+            </a:r>
+          </a:p>
+          <a:p>
+            <a:pPr algn="just"/>
+            <a:r>
+              <a:rPr lang="pt-BR" b="1" dirty="0"/>
+              <a:t>Status: [Concluído]</a:t>
+            </a:r>
+            <a:r>
+              <a:rPr lang="pt-BR" dirty="0"/>
+              <a:t>.</a:t>
+            </a:r>
+          </a:p>
+        </p:txBody>
+      </p:sp>
     </p:spTree>
     <p:extLst>
       <p:ext uri="{BB962C8B-B14F-4D97-AF65-F5344CB8AC3E}">
-        <p14:creationId xmlns:p14="http://schemas.microsoft.com/office/powerpoint/2010/main" val="681861647"/>
+        <p14:creationId xmlns:p14="http://schemas.microsoft.com/office/powerpoint/2010/main" val="1396510283"/>
       </p:ext>
     </p:extLst>
   </p:cSld>
   <p:clrMapOvr>
     <a:masterClrMapping/>
   </p:clrMapOvr>
+  <mc:AlternateContent xmlns:mc="http://schemas.openxmlformats.org/markup-compatibility/2006" xmlns:p14="http://schemas.microsoft.com/office/powerpoint/2010/main">
+    <mc:Choice Requires="p14">
+      <p:transition spd="slow" p14:dur="1300">
+        <p14:pan dir="u"/>
+      </p:transition>
+    </mc:Choice>
+    <mc:Fallback xmlns="">
+      <p:transition spd="slow">
+        <p:fade/>
+      </p:transition>
+    </mc:Fallback>
+  </mc:AlternateContent>
 </p:sld>
 </file>
 
@@ -3847,7 +3904,7 @@
           <a:p>
             <a:r>
               <a:rPr lang="pt-BR" dirty="0"/>
-              <a:t>2ª Estória</a:t>
+              <a:t>3ª Estória</a:t>
             </a:r>
           </a:p>
         </p:txBody>
@@ -3875,11 +3932,11 @@
             <a:pPr algn="just"/>
             <a:r>
               <a:rPr lang="pt-BR" b="1" dirty="0"/>
-              <a:t>2ª Estória: </a:t>
+              <a:t>3ª Estória: </a:t>
             </a:r>
             <a:r>
               <a:rPr lang="pt-BR" dirty="0"/>
-              <a:t>Elaboração da descrição detalhada do sistema, explicando seus requisitos funcionais e não funcionais.</a:t>
+              <a:t>Pesquisar a implementação do Banco de Dados e da Interface Gráfica.</a:t>
             </a:r>
           </a:p>
           <a:p>
@@ -3890,14 +3947,14 @@
             </a:r>
             <a:r>
               <a:rPr lang="pt-BR" dirty="0"/>
-              <a:t>: A descrição do sistema será entregue conforme a data prevista com todos os dados dos requisitos do sistema e com o diagrama de classes.</a:t>
+              <a:t>:   Entender como implementar um Banco de Dados e como juntar a interface aos scripts.</a:t>
             </a:r>
           </a:p>
           <a:p>
             <a:pPr algn="just"/>
             <a:r>
               <a:rPr lang="pt-BR" b="1" dirty="0"/>
-              <a:t>Status: [Concluído]</a:t>
+              <a:t>Status: [Em andamento]</a:t>
             </a:r>
             <a:r>
               <a:rPr lang="pt-BR" dirty="0"/>
@@ -3909,7 +3966,7 @@
     </p:spTree>
     <p:extLst>
       <p:ext uri="{BB962C8B-B14F-4D97-AF65-F5344CB8AC3E}">
-        <p14:creationId xmlns:p14="http://schemas.microsoft.com/office/powerpoint/2010/main" val="1396510283"/>
+        <p14:creationId xmlns:p14="http://schemas.microsoft.com/office/powerpoint/2010/main" val="774972579"/>
       </p:ext>
     </p:extLst>
   </p:cSld>
@@ -3950,124 +4007,6 @@
       </p:grpSpPr>
       <p:sp>
         <p:nvSpPr>
-          <p:cNvPr id="2" name="Título 1"/>
-          <p:cNvSpPr>
-            <a:spLocks noGrp="1"/>
-          </p:cNvSpPr>
-          <p:nvPr>
-            <p:ph type="title"/>
-          </p:nvPr>
-        </p:nvSpPr>
-        <p:spPr/>
-        <p:txBody>
-          <a:bodyPr/>
-          <a:lstStyle/>
-          <a:p>
-            <a:r>
-              <a:rPr lang="pt-BR" dirty="0"/>
-              <a:t>3ª Estória</a:t>
-            </a:r>
-          </a:p>
-        </p:txBody>
-      </p:sp>
-      <p:sp>
-        <p:nvSpPr>
-          <p:cNvPr id="3" name="Espaço Reservado para Conteúdo 2"/>
-          <p:cNvSpPr>
-            <a:spLocks noGrp="1"/>
-          </p:cNvSpPr>
-          <p:nvPr>
-            <p:ph idx="1"/>
-          </p:nvPr>
-        </p:nvSpPr>
-        <p:spPr>
-          <a:xfrm>
-            <a:off x="3869268" y="864108"/>
-            <a:ext cx="7490710" cy="5120640"/>
-          </a:xfrm>
-        </p:spPr>
-        <p:txBody>
-          <a:bodyPr/>
-          <a:lstStyle/>
-          <a:p>
-            <a:pPr algn="just"/>
-            <a:r>
-              <a:rPr lang="pt-BR" b="1" dirty="0"/>
-              <a:t>3ª Estória: </a:t>
-            </a:r>
-            <a:r>
-              <a:rPr lang="pt-BR" dirty="0"/>
-              <a:t>Pesquisar a implementação do Banco de Dados e da Interface Gráfica.</a:t>
-            </a:r>
-          </a:p>
-          <a:p>
-            <a:pPr algn="just"/>
-            <a:r>
-              <a:rPr lang="pt-BR" b="1" dirty="0"/>
-              <a:t>Descrição</a:t>
-            </a:r>
-            <a:r>
-              <a:rPr lang="pt-BR" dirty="0"/>
-              <a:t>:   Entender como implementar um Banco de Dados e como juntar a interface aos scripts.</a:t>
-            </a:r>
-          </a:p>
-          <a:p>
-            <a:pPr algn="just"/>
-            <a:r>
-              <a:rPr lang="pt-BR" b="1" dirty="0"/>
-              <a:t>Status: [Em andamento]</a:t>
-            </a:r>
-            <a:r>
-              <a:rPr lang="pt-BR" dirty="0"/>
-              <a:t>.</a:t>
-            </a:r>
-          </a:p>
-        </p:txBody>
-      </p:sp>
-    </p:spTree>
-    <p:extLst>
-      <p:ext uri="{BB962C8B-B14F-4D97-AF65-F5344CB8AC3E}">
-        <p14:creationId xmlns:p14="http://schemas.microsoft.com/office/powerpoint/2010/main" val="774972579"/>
-      </p:ext>
-    </p:extLst>
-  </p:cSld>
-  <p:clrMapOvr>
-    <a:masterClrMapping/>
-  </p:clrMapOvr>
-  <mc:AlternateContent xmlns:mc="http://schemas.openxmlformats.org/markup-compatibility/2006" xmlns:p14="http://schemas.microsoft.com/office/powerpoint/2010/main">
-    <mc:Choice Requires="p14">
-      <p:transition spd="slow" p14:dur="1300">
-        <p14:pan dir="u"/>
-      </p:transition>
-    </mc:Choice>
-    <mc:Fallback xmlns="">
-      <p:transition spd="slow">
-        <p:fade/>
-      </p:transition>
-    </mc:Fallback>
-  </mc:AlternateContent>
-</p:sld>
-</file>
-
-<file path=ppt/slides/slide7.xml><?xml version="1.0" encoding="utf-8"?>
-<p:sld xmlns:a="http://schemas.openxmlformats.org/drawingml/2006/main" xmlns:r="http://schemas.openxmlformats.org/officeDocument/2006/relationships" xmlns:p="http://schemas.openxmlformats.org/presentationml/2006/main">
-  <p:cSld>
-    <p:spTree>
-      <p:nvGrpSpPr>
-        <p:cNvPr id="1" name=""/>
-        <p:cNvGrpSpPr/>
-        <p:nvPr/>
-      </p:nvGrpSpPr>
-      <p:grpSpPr>
-        <a:xfrm>
-          <a:off x="0" y="0"/>
-          <a:ext cx="0" cy="0"/>
-          <a:chOff x="0" y="0"/>
-          <a:chExt cx="0" cy="0"/>
-        </a:xfrm>
-      </p:grpSpPr>
-      <p:sp>
-        <p:nvSpPr>
           <p:cNvPr id="12" name="Título 11"/>
           <p:cNvSpPr>
             <a:spLocks noGrp="1"/>
@@ -4132,7 +4071,7 @@
 </p:sld>
 </file>
 
-<file path=ppt/slides/slide8.xml><?xml version="1.0" encoding="utf-8"?>
+<file path=ppt/slides/slide7.xml><?xml version="1.0" encoding="utf-8"?>
 <p:sld xmlns:a="http://schemas.openxmlformats.org/drawingml/2006/main" xmlns:r="http://schemas.openxmlformats.org/officeDocument/2006/relationships" xmlns:p="http://schemas.openxmlformats.org/presentationml/2006/main">
   <p:cSld>
     <p:spTree>

</xml_diff>

<commit_message>
Alteração do Sprint 002
Adição do diagrama de classes no slide
</commit_message>
<xml_diff>
--- a/Sprints/Sprint_002 da equipe.pptx
+++ b/Sprints/Sprint_002 da equipe.pptx
@@ -8,11 +8,12 @@
     <p:sldId id="256" r:id="rId2"/>
     <p:sldId id="260" r:id="rId3"/>
     <p:sldId id="279" r:id="rId4"/>
-    <p:sldId id="281" r:id="rId5"/>
-    <p:sldId id="270" r:id="rId6"/>
-    <p:sldId id="261" r:id="rId7"/>
-    <p:sldId id="280" r:id="rId8"/>
-    <p:sldId id="282" r:id="rId9"/>
+    <p:sldId id="283" r:id="rId5"/>
+    <p:sldId id="281" r:id="rId6"/>
+    <p:sldId id="270" r:id="rId7"/>
+    <p:sldId id="261" r:id="rId8"/>
+    <p:sldId id="280" r:id="rId9"/>
+    <p:sldId id="282" r:id="rId10"/>
   </p:sldIdLst>
   <p:sldSz cx="12192000" cy="6858000"/>
   <p:notesSz cx="6858000" cy="9144000"/>
@@ -3770,104 +3771,46 @@
           <a:chExt cx="0" cy="0"/>
         </a:xfrm>
       </p:grpSpPr>
-      <p:sp>
-        <p:nvSpPr>
-          <p:cNvPr id="2" name="Título 1"/>
-          <p:cNvSpPr>
-            <a:spLocks noGrp="1"/>
-          </p:cNvSpPr>
-          <p:nvPr>
-            <p:ph type="title"/>
-          </p:nvPr>
-        </p:nvSpPr>
-        <p:spPr/>
-        <p:txBody>
-          <a:bodyPr/>
-          <a:lstStyle/>
-          <a:p>
-            <a:r>
-              <a:rPr lang="pt-BR" dirty="0"/>
-              <a:t>2ª Estória</a:t>
-            </a:r>
-          </a:p>
-        </p:txBody>
-      </p:sp>
-      <p:sp>
-        <p:nvSpPr>
-          <p:cNvPr id="3" name="Espaço Reservado para Conteúdo 2"/>
-          <p:cNvSpPr>
-            <a:spLocks noGrp="1"/>
-          </p:cNvSpPr>
-          <p:nvPr>
-            <p:ph idx="1"/>
-          </p:nvPr>
-        </p:nvSpPr>
+      <p:pic>
+        <p:nvPicPr>
+          <p:cNvPr id="3" name="Imagem 2">
+            <a:extLst>
+              <a:ext uri="{FF2B5EF4-FFF2-40B4-BE49-F238E27FC236}">
+                <a16:creationId xmlns:a16="http://schemas.microsoft.com/office/drawing/2014/main" id="{689A2362-A10B-473B-87D3-D078C4CF5ADF}"/>
+              </a:ext>
+            </a:extLst>
+          </p:cNvPr>
+          <p:cNvPicPr>
+            <a:picLocks noChangeAspect="1"/>
+          </p:cNvPicPr>
+          <p:nvPr/>
+        </p:nvPicPr>
+        <p:blipFill>
+          <a:blip r:embed="rId2"/>
+          <a:stretch>
+            <a:fillRect/>
+          </a:stretch>
+        </p:blipFill>
         <p:spPr>
           <a:xfrm>
-            <a:off x="3869268" y="864108"/>
-            <a:ext cx="7490710" cy="5120640"/>
+            <a:off x="-58449" y="327546"/>
+            <a:ext cx="12308898" cy="6202909"/>
           </a:xfrm>
+          <a:prstGeom prst="rect">
+            <a:avLst/>
+          </a:prstGeom>
         </p:spPr>
-        <p:txBody>
-          <a:bodyPr/>
-          <a:lstStyle/>
-          <a:p>
-            <a:pPr algn="just"/>
-            <a:r>
-              <a:rPr lang="pt-BR" b="1" dirty="0"/>
-              <a:t>2ª Estória: </a:t>
-            </a:r>
-            <a:r>
-              <a:rPr lang="pt-BR" dirty="0"/>
-              <a:t>Elaboração da descrição detalhada do sistema, explicando seus requisitos funcionais e não funcionais.</a:t>
-            </a:r>
-          </a:p>
-          <a:p>
-            <a:pPr algn="just"/>
-            <a:r>
-              <a:rPr lang="pt-BR" b="1" dirty="0"/>
-              <a:t>Descrição</a:t>
-            </a:r>
-            <a:r>
-              <a:rPr lang="pt-BR" dirty="0"/>
-              <a:t>: A descrição do sistema será entregue conforme a data prevista com todos os dados dos requisitos do sistema e com o diagrama de classes.</a:t>
-            </a:r>
-          </a:p>
-          <a:p>
-            <a:pPr algn="just"/>
-            <a:r>
-              <a:rPr lang="pt-BR" b="1" dirty="0"/>
-              <a:t>Status: [Concluído]</a:t>
-            </a:r>
-            <a:r>
-              <a:rPr lang="pt-BR" dirty="0"/>
-              <a:t>.</a:t>
-            </a:r>
-          </a:p>
-        </p:txBody>
-      </p:sp>
+      </p:pic>
     </p:spTree>
     <p:extLst>
       <p:ext uri="{BB962C8B-B14F-4D97-AF65-F5344CB8AC3E}">
-        <p14:creationId xmlns:p14="http://schemas.microsoft.com/office/powerpoint/2010/main" val="1396510283"/>
+        <p14:creationId xmlns:p14="http://schemas.microsoft.com/office/powerpoint/2010/main" val="3277345281"/>
       </p:ext>
     </p:extLst>
   </p:cSld>
   <p:clrMapOvr>
     <a:masterClrMapping/>
   </p:clrMapOvr>
-  <mc:AlternateContent xmlns:mc="http://schemas.openxmlformats.org/markup-compatibility/2006" xmlns:p14="http://schemas.microsoft.com/office/powerpoint/2010/main">
-    <mc:Choice Requires="p14">
-      <p:transition spd="slow" p14:dur="1300">
-        <p14:pan dir="u"/>
-      </p:transition>
-    </mc:Choice>
-    <mc:Fallback xmlns="">
-      <p:transition spd="slow">
-        <p:fade/>
-      </p:transition>
-    </mc:Fallback>
-  </mc:AlternateContent>
 </p:sld>
 </file>
 
@@ -3905,7 +3848,7 @@
           <a:p>
             <a:r>
               <a:rPr lang="pt-BR" dirty="0"/>
-              <a:t>3ª Estória</a:t>
+              <a:t>2ª Estória</a:t>
             </a:r>
           </a:p>
         </p:txBody>
@@ -3933,11 +3876,11 @@
             <a:pPr algn="just"/>
             <a:r>
               <a:rPr lang="pt-BR" b="1" dirty="0"/>
-              <a:t>3ª Estória: </a:t>
+              <a:t>2ª Estória: </a:t>
             </a:r>
             <a:r>
               <a:rPr lang="pt-BR" dirty="0"/>
-              <a:t>Pesquisar a implementação do Banco de Dados e da Interface Gráfica.</a:t>
+              <a:t>Elaboração da descrição detalhada do sistema, explicando seus requisitos funcionais e não funcionais.</a:t>
             </a:r>
           </a:p>
           <a:p>
@@ -3948,14 +3891,14 @@
             </a:r>
             <a:r>
               <a:rPr lang="pt-BR" dirty="0"/>
-              <a:t>:   Entender como implementar um Banco de Dados e como juntar a interface aos scripts.</a:t>
+              <a:t>: A descrição do sistema será entregue conforme a data prevista com todos os dados dos requisitos do sistema e com o diagrama de classes.</a:t>
             </a:r>
           </a:p>
           <a:p>
             <a:pPr algn="just"/>
             <a:r>
               <a:rPr lang="pt-BR" b="1" dirty="0"/>
-              <a:t>Status: [Em andamento]</a:t>
+              <a:t>Status: [Concluído]</a:t>
             </a:r>
             <a:r>
               <a:rPr lang="pt-BR" dirty="0"/>
@@ -3967,7 +3910,7 @@
     </p:spTree>
     <p:extLst>
       <p:ext uri="{BB962C8B-B14F-4D97-AF65-F5344CB8AC3E}">
-        <p14:creationId xmlns:p14="http://schemas.microsoft.com/office/powerpoint/2010/main" val="774972579"/>
+        <p14:creationId xmlns:p14="http://schemas.microsoft.com/office/powerpoint/2010/main" val="1396510283"/>
       </p:ext>
     </p:extLst>
   </p:cSld>
@@ -4008,7 +3951,7 @@
       </p:grpSpPr>
       <p:sp>
         <p:nvSpPr>
-          <p:cNvPr id="12" name="Título 11"/>
+          <p:cNvPr id="2" name="Título 1"/>
           <p:cNvSpPr>
             <a:spLocks noGrp="1"/>
           </p:cNvSpPr>
@@ -4023,34 +3966,69 @@
           <a:p>
             <a:r>
               <a:rPr lang="pt-BR" dirty="0"/>
-              <a:t>Estórias do Próximo Sprint</a:t>
-            </a:r>
-          </a:p>
-        </p:txBody>
-      </p:sp>
-      <p:sp>
-        <p:nvSpPr>
-          <p:cNvPr id="13" name="Espaço Reservado para Texto 12"/>
-          <p:cNvSpPr>
-            <a:spLocks noGrp="1"/>
-          </p:cNvSpPr>
-          <p:nvPr>
-            <p:ph type="body" idx="1"/>
-          </p:nvPr>
-        </p:nvSpPr>
-        <p:spPr/>
-        <p:txBody>
-          <a:bodyPr/>
-          <a:lstStyle/>
-          <a:p>
-            <a:endParaRPr lang="pt-BR" dirty="0"/>
+              <a:t>3ª Estória</a:t>
+            </a:r>
+          </a:p>
+        </p:txBody>
+      </p:sp>
+      <p:sp>
+        <p:nvSpPr>
+          <p:cNvPr id="3" name="Espaço Reservado para Conteúdo 2"/>
+          <p:cNvSpPr>
+            <a:spLocks noGrp="1"/>
+          </p:cNvSpPr>
+          <p:nvPr>
+            <p:ph idx="1"/>
+          </p:nvPr>
+        </p:nvSpPr>
+        <p:spPr>
+          <a:xfrm>
+            <a:off x="3869268" y="864108"/>
+            <a:ext cx="7490710" cy="5120640"/>
+          </a:xfrm>
+        </p:spPr>
+        <p:txBody>
+          <a:bodyPr/>
+          <a:lstStyle/>
+          <a:p>
+            <a:pPr algn="just"/>
+            <a:r>
+              <a:rPr lang="pt-BR" b="1" dirty="0"/>
+              <a:t>3ª Estória: </a:t>
+            </a:r>
+            <a:r>
+              <a:rPr lang="pt-BR" dirty="0"/>
+              <a:t>Pesquisar a implementação do Banco de Dados e da Interface Gráfica.</a:t>
+            </a:r>
+          </a:p>
+          <a:p>
+            <a:pPr algn="just"/>
+            <a:r>
+              <a:rPr lang="pt-BR" b="1" dirty="0"/>
+              <a:t>Descrição</a:t>
+            </a:r>
+            <a:r>
+              <a:rPr lang="pt-BR" dirty="0"/>
+              <a:t>:   Entender como implementar um Banco de Dados e como juntar a interface aos scripts.</a:t>
+            </a:r>
+          </a:p>
+          <a:p>
+            <a:pPr algn="just"/>
+            <a:r>
+              <a:rPr lang="pt-BR" b="1" dirty="0"/>
+              <a:t>Status: [Em andamento]</a:t>
+            </a:r>
+            <a:r>
+              <a:rPr lang="pt-BR" dirty="0"/>
+              <a:t>.</a:t>
+            </a:r>
           </a:p>
         </p:txBody>
       </p:sp>
     </p:spTree>
     <p:extLst>
       <p:ext uri="{BB962C8B-B14F-4D97-AF65-F5344CB8AC3E}">
-        <p14:creationId xmlns:p14="http://schemas.microsoft.com/office/powerpoint/2010/main" val="503902318"/>
+        <p14:creationId xmlns:p14="http://schemas.microsoft.com/office/powerpoint/2010/main" val="774972579"/>
       </p:ext>
     </p:extLst>
   </p:cSld>
@@ -4091,6 +4069,89 @@
       </p:grpSpPr>
       <p:sp>
         <p:nvSpPr>
+          <p:cNvPr id="12" name="Título 11"/>
+          <p:cNvSpPr>
+            <a:spLocks noGrp="1"/>
+          </p:cNvSpPr>
+          <p:nvPr>
+            <p:ph type="title"/>
+          </p:nvPr>
+        </p:nvSpPr>
+        <p:spPr/>
+        <p:txBody>
+          <a:bodyPr/>
+          <a:lstStyle/>
+          <a:p>
+            <a:r>
+              <a:rPr lang="pt-BR" dirty="0"/>
+              <a:t>Estórias do Próximo Sprint</a:t>
+            </a:r>
+          </a:p>
+        </p:txBody>
+      </p:sp>
+      <p:sp>
+        <p:nvSpPr>
+          <p:cNvPr id="13" name="Espaço Reservado para Texto 12"/>
+          <p:cNvSpPr>
+            <a:spLocks noGrp="1"/>
+          </p:cNvSpPr>
+          <p:nvPr>
+            <p:ph type="body" idx="1"/>
+          </p:nvPr>
+        </p:nvSpPr>
+        <p:spPr/>
+        <p:txBody>
+          <a:bodyPr/>
+          <a:lstStyle/>
+          <a:p>
+            <a:endParaRPr lang="pt-BR" dirty="0"/>
+          </a:p>
+        </p:txBody>
+      </p:sp>
+    </p:spTree>
+    <p:extLst>
+      <p:ext uri="{BB962C8B-B14F-4D97-AF65-F5344CB8AC3E}">
+        <p14:creationId xmlns:p14="http://schemas.microsoft.com/office/powerpoint/2010/main" val="503902318"/>
+      </p:ext>
+    </p:extLst>
+  </p:cSld>
+  <p:clrMapOvr>
+    <a:masterClrMapping/>
+  </p:clrMapOvr>
+  <mc:AlternateContent xmlns:mc="http://schemas.openxmlformats.org/markup-compatibility/2006" xmlns:p14="http://schemas.microsoft.com/office/powerpoint/2010/main">
+    <mc:Choice Requires="p14">
+      <p:transition spd="slow" p14:dur="1300">
+        <p14:pan dir="u"/>
+      </p:transition>
+    </mc:Choice>
+    <mc:Fallback xmlns="">
+      <p:transition spd="slow">
+        <p:fade/>
+      </p:transition>
+    </mc:Fallback>
+  </mc:AlternateContent>
+</p:sld>
+</file>
+
+<file path=ppt/slides/slide8.xml><?xml version="1.0" encoding="utf-8"?>
+<p:sld xmlns:a="http://schemas.openxmlformats.org/drawingml/2006/main" xmlns:r="http://schemas.openxmlformats.org/officeDocument/2006/relationships" xmlns:p="http://schemas.openxmlformats.org/presentationml/2006/main">
+  <p:cSld>
+    <p:spTree>
+      <p:nvGrpSpPr>
+        <p:cNvPr id="1" name=""/>
+        <p:cNvGrpSpPr/>
+        <p:nvPr/>
+      </p:nvGrpSpPr>
+      <p:grpSpPr>
+        <a:xfrm>
+          <a:off x="0" y="0"/>
+          <a:ext cx="0" cy="0"/>
+          <a:chOff x="0" y="0"/>
+          <a:chExt cx="0" cy="0"/>
+        </a:xfrm>
+      </p:grpSpPr>
+      <p:sp>
+        <p:nvSpPr>
           <p:cNvPr id="2" name="Título 1"/>
           <p:cNvSpPr>
             <a:spLocks noGrp="1"/>
@@ -4199,7 +4260,7 @@
 </p:sld>
 </file>
 
-<file path=ppt/slides/slide8.xml><?xml version="1.0" encoding="utf-8"?>
+<file path=ppt/slides/slide9.xml><?xml version="1.0" encoding="utf-8"?>
 <p:sld xmlns:a="http://schemas.openxmlformats.org/drawingml/2006/main" xmlns:r="http://schemas.openxmlformats.org/officeDocument/2006/relationships" xmlns:p="http://schemas.openxmlformats.org/presentationml/2006/main">
   <p:cSld>
     <p:spTree>

</xml_diff>